<commit_message>
container app set up
</commit_message>
<xml_diff>
--- a/docs/Secure-Rest-Api-App.pptx
+++ b/docs/Secure-Rest-Api-App.pptx
@@ -167,54 +167,6 @@
     </pc:docChg>
   </pc:docChgLst>
   <pc:docChgLst>
-    <pc:chgData name="Gaiye Zhou" userId="57624dc8-72d9-4103-85d2-3bb69491f2d7" providerId="ADAL" clId="{EE97EEA1-D438-4B58-A4A1-97DEE8318B2A}"/>
-    <pc:docChg chg="undo custSel modSld">
-      <pc:chgData name="Gaiye Zhou" userId="57624dc8-72d9-4103-85d2-3bb69491f2d7" providerId="ADAL" clId="{EE97EEA1-D438-4B58-A4A1-97DEE8318B2A}" dt="2025-01-10T20:14:00.474" v="125" actId="1076"/>
-      <pc:docMkLst>
-        <pc:docMk/>
-      </pc:docMkLst>
-      <pc:sldChg chg="addSp delSp modSp mod">
-        <pc:chgData name="Gaiye Zhou" userId="57624dc8-72d9-4103-85d2-3bb69491f2d7" providerId="ADAL" clId="{EE97EEA1-D438-4B58-A4A1-97DEE8318B2A}" dt="2025-01-10T20:14:00.474" v="125" actId="1076"/>
-        <pc:sldMkLst>
-          <pc:docMk/>
-          <pc:sldMk cId="712083684" sldId="2147470321"/>
-        </pc:sldMkLst>
-        <pc:spChg chg="mod">
-          <ac:chgData name="Gaiye Zhou" userId="57624dc8-72d9-4103-85d2-3bb69491f2d7" providerId="ADAL" clId="{EE97EEA1-D438-4B58-A4A1-97DEE8318B2A}" dt="2025-01-10T20:14:00.474" v="125" actId="1076"/>
-          <ac:spMkLst>
-            <pc:docMk/>
-            <pc:sldMk cId="712083684" sldId="2147470321"/>
-            <ac:spMk id="48" creationId="{0C10245E-BD5F-07FF-724A-0E332820C4D3}"/>
-          </ac:spMkLst>
-        </pc:spChg>
-        <pc:picChg chg="add mod">
-          <ac:chgData name="Gaiye Zhou" userId="57624dc8-72d9-4103-85d2-3bb69491f2d7" providerId="ADAL" clId="{EE97EEA1-D438-4B58-A4A1-97DEE8318B2A}" dt="2025-01-10T20:13:56.346" v="124" actId="1076"/>
-          <ac:picMkLst>
-            <pc:docMk/>
-            <pc:sldMk cId="712083684" sldId="2147470321"/>
-            <ac:picMk id="32" creationId="{6F02CF25-89B0-2752-DE8C-9BCE15A5F548}"/>
-          </ac:picMkLst>
-        </pc:picChg>
-      </pc:sldChg>
-    </pc:docChg>
-  </pc:docChgLst>
-  <pc:docChgLst>
-    <pc:chgData name="Brandon Cowen" userId="S::brandoncowen@microsoft.com::4a3d2f45-d458-4af1-9194-9e74c349f437" providerId="AD" clId="Web-{E00216F6-2701-1CCF-AFBC-74B8569FF3F1}"/>
-    <pc:docChg chg="modSld">
-      <pc:chgData name="Brandon Cowen" userId="S::brandoncowen@microsoft.com::4a3d2f45-d458-4af1-9194-9e74c349f437" providerId="AD" clId="Web-{E00216F6-2701-1CCF-AFBC-74B8569FF3F1}" dt="2023-02-08T17:12:48.859" v="16" actId="20577"/>
-      <pc:docMkLst>
-        <pc:docMk/>
-      </pc:docMkLst>
-      <pc:sldChg chg="addSp delSp modSp">
-        <pc:chgData name="Brandon Cowen" userId="S::brandoncowen@microsoft.com::4a3d2f45-d458-4af1-9194-9e74c349f437" providerId="AD" clId="Web-{E00216F6-2701-1CCF-AFBC-74B8569FF3F1}" dt="2023-02-08T17:12:48.859" v="16" actId="20577"/>
-        <pc:sldMkLst>
-          <pc:docMk/>
-          <pc:sldMk cId="2973216957" sldId="2147470318"/>
-        </pc:sldMkLst>
-      </pc:sldChg>
-    </pc:docChg>
-  </pc:docChgLst>
-  <pc:docChgLst>
     <pc:chgData name="Paweena Tongbai (Lionbridge Technologies Inc)" userId="2b9f2c3d-e641-4e58-85cf-3fb104de0a4b" providerId="ADAL" clId="{0CE08B44-E304-4FD9-B502-F30468332638}"/>
     <pc:docChg chg="undo custSel addSld delSld modSld">
       <pc:chgData name="Paweena Tongbai (Lionbridge Technologies Inc)" userId="2b9f2c3d-e641-4e58-85cf-3fb104de0a4b" providerId="ADAL" clId="{0CE08B44-E304-4FD9-B502-F30468332638}" dt="2023-03-11T01:10:43.946" v="321" actId="12788"/>
@@ -248,6 +200,54 @@
           <pc:docMk/>
           <pc:sldMk cId="3662562578" sldId="2147470321"/>
         </pc:sldMkLst>
+      </pc:sldChg>
+    </pc:docChg>
+  </pc:docChgLst>
+  <pc:docChgLst>
+    <pc:chgData name="Brandon Cowen" userId="S::brandoncowen@microsoft.com::4a3d2f45-d458-4af1-9194-9e74c349f437" providerId="AD" clId="Web-{E00216F6-2701-1CCF-AFBC-74B8569FF3F1}"/>
+    <pc:docChg chg="modSld">
+      <pc:chgData name="Brandon Cowen" userId="S::brandoncowen@microsoft.com::4a3d2f45-d458-4af1-9194-9e74c349f437" providerId="AD" clId="Web-{E00216F6-2701-1CCF-AFBC-74B8569FF3F1}" dt="2023-02-08T17:12:48.859" v="16" actId="20577"/>
+      <pc:docMkLst>
+        <pc:docMk/>
+      </pc:docMkLst>
+      <pc:sldChg chg="addSp delSp modSp">
+        <pc:chgData name="Brandon Cowen" userId="S::brandoncowen@microsoft.com::4a3d2f45-d458-4af1-9194-9e74c349f437" providerId="AD" clId="Web-{E00216F6-2701-1CCF-AFBC-74B8569FF3F1}" dt="2023-02-08T17:12:48.859" v="16" actId="20577"/>
+        <pc:sldMkLst>
+          <pc:docMk/>
+          <pc:sldMk cId="2973216957" sldId="2147470318"/>
+        </pc:sldMkLst>
+      </pc:sldChg>
+    </pc:docChg>
+  </pc:docChgLst>
+  <pc:docChgLst>
+    <pc:chgData name="Gaiye Zhou" userId="57624dc8-72d9-4103-85d2-3bb69491f2d7" providerId="ADAL" clId="{EE97EEA1-D438-4B58-A4A1-97DEE8318B2A}"/>
+    <pc:docChg chg="undo custSel modSld">
+      <pc:chgData name="Gaiye Zhou" userId="57624dc8-72d9-4103-85d2-3bb69491f2d7" providerId="ADAL" clId="{EE97EEA1-D438-4B58-A4A1-97DEE8318B2A}" dt="2025-01-10T20:14:00.474" v="125" actId="1076"/>
+      <pc:docMkLst>
+        <pc:docMk/>
+      </pc:docMkLst>
+      <pc:sldChg chg="addSp delSp modSp mod">
+        <pc:chgData name="Gaiye Zhou" userId="57624dc8-72d9-4103-85d2-3bb69491f2d7" providerId="ADAL" clId="{EE97EEA1-D438-4B58-A4A1-97DEE8318B2A}" dt="2025-01-10T20:14:00.474" v="125" actId="1076"/>
+        <pc:sldMkLst>
+          <pc:docMk/>
+          <pc:sldMk cId="712083684" sldId="2147470321"/>
+        </pc:sldMkLst>
+        <pc:spChg chg="mod">
+          <ac:chgData name="Gaiye Zhou" userId="57624dc8-72d9-4103-85d2-3bb69491f2d7" providerId="ADAL" clId="{EE97EEA1-D438-4B58-A4A1-97DEE8318B2A}" dt="2025-01-10T20:14:00.474" v="125" actId="1076"/>
+          <ac:spMkLst>
+            <pc:docMk/>
+            <pc:sldMk cId="712083684" sldId="2147470321"/>
+            <ac:spMk id="48" creationId="{0C10245E-BD5F-07FF-724A-0E332820C4D3}"/>
+          </ac:spMkLst>
+        </pc:spChg>
+        <pc:picChg chg="add mod">
+          <ac:chgData name="Gaiye Zhou" userId="57624dc8-72d9-4103-85d2-3bb69491f2d7" providerId="ADAL" clId="{EE97EEA1-D438-4B58-A4A1-97DEE8318B2A}" dt="2025-01-10T20:13:56.346" v="124" actId="1076"/>
+          <ac:picMkLst>
+            <pc:docMk/>
+            <pc:sldMk cId="712083684" sldId="2147470321"/>
+            <ac:picMk id="32" creationId="{6F02CF25-89B0-2752-DE8C-9BCE15A5F548}"/>
+          </ac:picMkLst>
+        </pc:picChg>
       </pc:sldChg>
     </pc:docChg>
   </pc:docChgLst>
@@ -814,7 +814,7 @@
           <a:p>
             <a:fld id="{F75D224A-AA7B-4AF2-B78F-AE8C19643E75}" type="datetimeFigureOut">
               <a:rPr lang="en-US" smtClean="0"/>
-              <a:t>2/28/2025</a:t>
+              <a:t>3/25/2025</a:t>
             </a:fld>
             <a:endParaRPr lang="en-US"/>
           </a:p>
@@ -1312,7 +1312,7 @@
           <a:p>
             <a:fld id="{622D8DFC-99A5-483F-9E79-FE8D6FEFD48F}" type="datetimeFigureOut">
               <a:rPr lang="en-US" smtClean="0"/>
-              <a:t>2/28/2025</a:t>
+              <a:t>3/25/2025</a:t>
             </a:fld>
             <a:endParaRPr lang="en-US"/>
           </a:p>
@@ -1510,7 +1510,7 @@
           <a:p>
             <a:fld id="{622D8DFC-99A5-483F-9E79-FE8D6FEFD48F}" type="datetimeFigureOut">
               <a:rPr lang="en-US" smtClean="0"/>
-              <a:t>2/28/2025</a:t>
+              <a:t>3/25/2025</a:t>
             </a:fld>
             <a:endParaRPr lang="en-US"/>
           </a:p>
@@ -1718,7 +1718,7 @@
           <a:p>
             <a:fld id="{622D8DFC-99A5-483F-9E79-FE8D6FEFD48F}" type="datetimeFigureOut">
               <a:rPr lang="en-US" smtClean="0"/>
-              <a:t>2/28/2025</a:t>
+              <a:t>3/25/2025</a:t>
             </a:fld>
             <a:endParaRPr lang="en-US"/>
           </a:p>
@@ -2171,7 +2171,7 @@
           <a:p>
             <a:fld id="{622D8DFC-99A5-483F-9E79-FE8D6FEFD48F}" type="datetimeFigureOut">
               <a:rPr lang="en-US" smtClean="0"/>
-              <a:t>2/28/2025</a:t>
+              <a:t>3/25/2025</a:t>
             </a:fld>
             <a:endParaRPr lang="en-US"/>
           </a:p>
@@ -2446,7 +2446,7 @@
           <a:p>
             <a:fld id="{622D8DFC-99A5-483F-9E79-FE8D6FEFD48F}" type="datetimeFigureOut">
               <a:rPr lang="en-US" smtClean="0"/>
-              <a:t>2/28/2025</a:t>
+              <a:t>3/25/2025</a:t>
             </a:fld>
             <a:endParaRPr lang="en-US"/>
           </a:p>
@@ -2711,7 +2711,7 @@
           <a:p>
             <a:fld id="{622D8DFC-99A5-483F-9E79-FE8D6FEFD48F}" type="datetimeFigureOut">
               <a:rPr lang="en-US" smtClean="0"/>
-              <a:t>2/28/2025</a:t>
+              <a:t>3/25/2025</a:t>
             </a:fld>
             <a:endParaRPr lang="en-US"/>
           </a:p>
@@ -3123,7 +3123,7 @@
           <a:p>
             <a:fld id="{622D8DFC-99A5-483F-9E79-FE8D6FEFD48F}" type="datetimeFigureOut">
               <a:rPr lang="en-US" smtClean="0"/>
-              <a:t>2/28/2025</a:t>
+              <a:t>3/25/2025</a:t>
             </a:fld>
             <a:endParaRPr lang="en-US"/>
           </a:p>
@@ -3264,7 +3264,7 @@
           <a:p>
             <a:fld id="{622D8DFC-99A5-483F-9E79-FE8D6FEFD48F}" type="datetimeFigureOut">
               <a:rPr lang="en-US" smtClean="0"/>
-              <a:t>2/28/2025</a:t>
+              <a:t>3/25/2025</a:t>
             </a:fld>
             <a:endParaRPr lang="en-US"/>
           </a:p>
@@ -3377,7 +3377,7 @@
           <a:p>
             <a:fld id="{622D8DFC-99A5-483F-9E79-FE8D6FEFD48F}" type="datetimeFigureOut">
               <a:rPr lang="en-US" smtClean="0"/>
-              <a:t>2/28/2025</a:t>
+              <a:t>3/25/2025</a:t>
             </a:fld>
             <a:endParaRPr lang="en-US"/>
           </a:p>
@@ -3688,7 +3688,7 @@
           <a:p>
             <a:fld id="{622D8DFC-99A5-483F-9E79-FE8D6FEFD48F}" type="datetimeFigureOut">
               <a:rPr lang="en-US" smtClean="0"/>
-              <a:t>2/28/2025</a:t>
+              <a:t>3/25/2025</a:t>
             </a:fld>
             <a:endParaRPr lang="en-US"/>
           </a:p>
@@ -3976,7 +3976,7 @@
           <a:p>
             <a:fld id="{622D8DFC-99A5-483F-9E79-FE8D6FEFD48F}" type="datetimeFigureOut">
               <a:rPr lang="en-US" smtClean="0"/>
-              <a:t>2/28/2025</a:t>
+              <a:t>3/25/2025</a:t>
             </a:fld>
             <a:endParaRPr lang="en-US"/>
           </a:p>
@@ -4217,7 +4217,7 @@
           <a:p>
             <a:fld id="{622D8DFC-99A5-483F-9E79-FE8D6FEFD48F}" type="datetimeFigureOut">
               <a:rPr lang="en-US" smtClean="0"/>
-              <a:t>2/28/2025</a:t>
+              <a:t>3/25/2025</a:t>
             </a:fld>
             <a:endParaRPr lang="en-US"/>
           </a:p>
@@ -5300,6 +5300,7 @@
             <a:avLst/>
           </a:prstGeom>
           <a:ln w="25400">
+            <a:prstDash val="sysDash"/>
             <a:tailEnd w="lg" len="lg"/>
           </a:ln>
         </p:spPr>
@@ -5344,6 +5345,7 @@
             <a:solidFill>
               <a:schemeClr val="tx1"/>
             </a:solidFill>
+            <a:prstDash val="sysDash"/>
             <a:headEnd type="none" w="lg" len="med"/>
             <a:tailEnd type="triangle" w="lg" len="lg"/>
           </a:ln>
@@ -5389,6 +5391,7 @@
             <a:solidFill>
               <a:schemeClr val="tx1"/>
             </a:solidFill>
+            <a:prstDash val="sysDash"/>
             <a:headEnd type="none" w="lg" len="med"/>
             <a:tailEnd type="triangle" w="lg" len="lg"/>
           </a:ln>
@@ -6463,6 +6466,7 @@
             <a:avLst/>
           </a:prstGeom>
           <a:ln w="25400">
+            <a:prstDash val="sysDash"/>
             <a:tailEnd w="lg" len="lg"/>
           </a:ln>
         </p:spPr>
@@ -7172,15 +7176,6 @@
 </file>
 
 <file path=customXml/item1.xml><?xml version="1.0" encoding="utf-8"?>
-<?mso-contentType ?>
-<FormTemplates xmlns="http://schemas.microsoft.com/sharepoint/v3/contenttype/forms">
-  <Display>DocumentLibraryForm</Display>
-  <Edit>DocumentLibraryForm</Edit>
-  <New>DocumentLibraryForm</New>
-</FormTemplates>
-</file>
-
-<file path=customXml/item2.xml><?xml version="1.0" encoding="utf-8"?>
 <ct:contentTypeSchema xmlns:ct="http://schemas.microsoft.com/office/2006/metadata/contentType" xmlns:ma="http://schemas.microsoft.com/office/2006/metadata/properties/metaAttributes" ct:_="" ma:_="" ma:contentTypeName="Document" ma:contentTypeID="0x0101004393101A1DC9B14E920AEC1207759D8A" ma:contentTypeVersion="20" ma:contentTypeDescription="Create a new document." ma:contentTypeScope="" ma:versionID="0d181b5c4d9e98e75c568baa24c9ee5b">
   <xsd:schema xmlns:xsd="http://www.w3.org/2001/XMLSchema" xmlns:xs="http://www.w3.org/2001/XMLSchema" xmlns:p="http://schemas.microsoft.com/office/2006/metadata/properties" xmlns:ns1="http://schemas.microsoft.com/sharepoint/v3" xmlns:ns2="9d03ce06-685b-418c-8101-ca27946f3f9e" xmlns:ns3="230e9df3-be65-4c73-a93b-d1236ebd677e" xmlns:ns4="6c51fb8b-8e9e-424f-b446-9b2a950b0006" targetNamespace="http://schemas.microsoft.com/office/2006/metadata/properties" ma:root="true" ma:fieldsID="37e5b38d01238b6f015d30865e22ae3a" ns1:_="" ns2:_="" ns3:_="" ns4:_="">
     <xsd:import namespace="http://schemas.microsoft.com/sharepoint/v3"/>
@@ -7447,6 +7442,15 @@
 </ct:contentTypeSchema>
 </file>
 
+<file path=customXml/item2.xml><?xml version="1.0" encoding="utf-8"?>
+<?mso-contentType ?>
+<FormTemplates xmlns="http://schemas.microsoft.com/sharepoint/v3/contenttype/forms">
+  <Display>DocumentLibraryForm</Display>
+  <Edit>DocumentLibraryForm</Edit>
+  <New>DocumentLibraryForm</New>
+</FormTemplates>
+</file>
+
 <file path=customXml/item3.xml><?xml version="1.0" encoding="utf-8"?>
 <p:properties xmlns:p="http://schemas.microsoft.com/office/2006/metadata/properties" xmlns:xsi="http://www.w3.org/2001/XMLSchema-instance" xmlns:pc="http://schemas.microsoft.com/office/infopath/2007/PartnerControls">
   <documentManagement>
@@ -7462,14 +7466,6 @@
 </file>
 
 <file path=customXml/itemProps1.xml><?xml version="1.0" encoding="utf-8"?>
-<ds:datastoreItem xmlns:ds="http://schemas.openxmlformats.org/officeDocument/2006/customXml" ds:itemID="{113220A2-EEC3-42C6-B708-AF5124D23717}">
-  <ds:schemaRefs>
-    <ds:schemaRef ds:uri="http://schemas.microsoft.com/sharepoint/v3/contenttype/forms"/>
-  </ds:schemaRefs>
-</ds:datastoreItem>
-</file>
-
-<file path=customXml/itemProps2.xml><?xml version="1.0" encoding="utf-8"?>
 <ds:datastoreItem xmlns:ds="http://schemas.openxmlformats.org/officeDocument/2006/customXml" ds:itemID="{1862FBFE-0CF9-4FEB-A4AD-01F27F7B2B28}">
   <ds:schemaRefs>
     <ds:schemaRef ds:uri="230e9df3-be65-4c73-a93b-d1236ebd677e"/>
@@ -7486,6 +7482,14 @@
     <ds:schemaRef ds:uri="http://schemas.microsoft.com/sharepoint/v3"/>
     <ds:schemaRef ds:uri="http://schemas.openxmlformats.org/package/2006/metadata/core-properties"/>
     <ds:schemaRef ds:uri="http://www.w3.org/2001/XMLSchema"/>
+  </ds:schemaRefs>
+</ds:datastoreItem>
+</file>
+
+<file path=customXml/itemProps2.xml><?xml version="1.0" encoding="utf-8"?>
+<ds:datastoreItem xmlns:ds="http://schemas.openxmlformats.org/officeDocument/2006/customXml" ds:itemID="{113220A2-EEC3-42C6-B708-AF5124D23717}">
+  <ds:schemaRefs>
+    <ds:schemaRef ds:uri="http://schemas.microsoft.com/sharepoint/v3/contenttype/forms"/>
   </ds:schemaRefs>
 </ds:datastoreItem>
 </file>

</xml_diff>